<commit_message>
Check point on System Verification prototyping HAMR micro VCs in Slang
</commit_message>
<xml_diff>
--- a/GUMBO-compositional-reasoning/GUMBO-system-reasoning-principles.pptx
+++ b/GUMBO-compositional-reasoning/GUMBO-system-reasoning-principles.pptx
@@ -30833,7 +30833,7 @@
           <a:p>
             <a:r>
               <a:rPr lang="en-US" sz="1800" dirty="0"/>
-              <a:t>Framework Invariant (System Assertion)</a:t>
+              <a:t>System Assertion</a:t>
             </a:r>
           </a:p>
           <a:p>
@@ -31384,8 +31384,8 @@
         </p:nvSpPr>
         <p:spPr>
           <a:xfrm>
-            <a:off x="2091630" y="5831545"/>
-            <a:ext cx="386644" cy="261610"/>
+            <a:off x="1981200" y="5831545"/>
+            <a:ext cx="854721" cy="261610"/>
           </a:xfrm>
           <a:prstGeom prst="rect">
             <a:avLst/>
@@ -31402,7 +31402,7 @@
           <a:p>
             <a:r>
               <a:rPr lang="en-US" sz="1100" dirty="0"/>
-              <a:t>Inv</a:t>
+              <a:t>SysAssert1</a:t>
             </a:r>
           </a:p>
         </p:txBody>
@@ -31422,7 +31422,7 @@
         <p:spPr>
           <a:xfrm>
             <a:off x="5519457" y="5834390"/>
-            <a:ext cx="386644" cy="261610"/>
+            <a:ext cx="854721" cy="261610"/>
           </a:xfrm>
           <a:prstGeom prst="rect">
             <a:avLst/>
@@ -31439,7 +31439,7 @@
           <a:p>
             <a:r>
               <a:rPr lang="en-US" sz="1100" dirty="0"/>
-              <a:t>Inv</a:t>
+              <a:t>SysAssert2</a:t>
             </a:r>
           </a:p>
         </p:txBody>
@@ -31530,13 +31530,13 @@
           <a:p>
             <a:r>
               <a:rPr lang="en-US" dirty="0"/>
-              <a:t>Inv implies Pre</a:t>
+              <a:t>SysAssert1 implies Pre</a:t>
             </a:r>
           </a:p>
           <a:p>
             <a:r>
               <a:rPr lang="en-US" dirty="0"/>
-              <a:t>Inv &amp; Post implies Inv</a:t>
+              <a:t>SysAssert1 &amp; Post implies SysAssert2</a:t>
             </a:r>
           </a:p>
         </p:txBody>
@@ -32069,8 +32069,8 @@
         </p:nvSpPr>
         <p:spPr>
           <a:xfrm>
-            <a:off x="2224999" y="2176584"/>
-            <a:ext cx="386644" cy="261610"/>
+            <a:off x="2057400" y="2176584"/>
+            <a:ext cx="854721" cy="261610"/>
           </a:xfrm>
           <a:prstGeom prst="rect">
             <a:avLst/>
@@ -32087,7 +32087,7 @@
           <a:p>
             <a:r>
               <a:rPr lang="en-US" sz="1100" dirty="0"/>
-              <a:t>Inv</a:t>
+              <a:t>SysAssert1</a:t>
             </a:r>
           </a:p>
         </p:txBody>
@@ -32107,7 +32107,7 @@
         <p:spPr>
           <a:xfrm>
             <a:off x="5652826" y="2179429"/>
-            <a:ext cx="386644" cy="261610"/>
+            <a:ext cx="854721" cy="261610"/>
           </a:xfrm>
           <a:prstGeom prst="rect">
             <a:avLst/>
@@ -32124,7 +32124,7 @@
           <a:p>
             <a:r>
               <a:rPr lang="en-US" sz="1100" dirty="0"/>
-              <a:t>Inv</a:t>
+              <a:t>SysAssert2</a:t>
             </a:r>
           </a:p>
         </p:txBody>
@@ -33564,8 +33564,8 @@
         </p:nvSpPr>
         <p:spPr>
           <a:xfrm>
-            <a:off x="4129999" y="2085145"/>
-            <a:ext cx="386644" cy="261610"/>
+            <a:off x="3959564" y="2099404"/>
+            <a:ext cx="854721" cy="261610"/>
           </a:xfrm>
           <a:prstGeom prst="rect">
             <a:avLst/>
@@ -33582,7 +33582,7 @@
           <a:p>
             <a:r>
               <a:rPr lang="en-US" sz="1100" dirty="0"/>
-              <a:t>Inv</a:t>
+              <a:t>SysAssert1</a:t>
             </a:r>
           </a:p>
         </p:txBody>
@@ -33602,7 +33602,7 @@
         <p:spPr>
           <a:xfrm>
             <a:off x="7557826" y="2087990"/>
-            <a:ext cx="386644" cy="261610"/>
+            <a:ext cx="854721" cy="261610"/>
           </a:xfrm>
           <a:prstGeom prst="rect">
             <a:avLst/>
@@ -33619,7 +33619,7 @@
           <a:p>
             <a:r>
               <a:rPr lang="en-US" sz="1100" dirty="0"/>
-              <a:t>Inv</a:t>
+              <a:t>SysAssert2</a:t>
             </a:r>
           </a:p>
         </p:txBody>
@@ -33638,8 +33638,8 @@
         </p:nvSpPr>
         <p:spPr>
           <a:xfrm>
-            <a:off x="381000" y="1954340"/>
-            <a:ext cx="386644" cy="261610"/>
+            <a:off x="2903" y="2008991"/>
+            <a:ext cx="777777" cy="261610"/>
           </a:xfrm>
           <a:prstGeom prst="rect">
             <a:avLst/>
@@ -33655,9 +33655,10 @@
           <a:lstStyle/>
           <a:p>
             <a:r>
-              <a:rPr lang="en-US" sz="1100" dirty="0"/>
-              <a:t>Inv</a:t>
-            </a:r>
+              <a:rPr lang="en-US" sz="1100" dirty="0" err="1"/>
+              <a:t>SysAssert</a:t>
+            </a:r>
+            <a:endParaRPr lang="en-US" sz="1100" dirty="0"/>
           </a:p>
         </p:txBody>
       </p:sp>
@@ -40833,8 +40834,8 @@
         </p:nvSpPr>
         <p:spPr>
           <a:xfrm>
-            <a:off x="457200" y="4655111"/>
-            <a:ext cx="1613775" cy="461665"/>
+            <a:off x="15023" y="4801587"/>
+            <a:ext cx="901657" cy="276999"/>
           </a:xfrm>
           <a:prstGeom prst="rect">
             <a:avLst/>
@@ -40848,10 +40849,10 @@
           <a:lstStyle/>
           <a:p>
             <a:r>
-              <a:rPr lang="en-US" dirty="0" err="1"/>
+              <a:rPr lang="en-US" sz="1200" dirty="0" err="1"/>
               <a:t>Reg_begin</a:t>
             </a:r>
-            <a:endParaRPr lang="en-US" dirty="0"/>
+            <a:endParaRPr lang="en-US" sz="1200" dirty="0"/>
           </a:p>
         </p:txBody>
       </p:sp>
@@ -41300,7 +41301,7 @@
         </p:nvSpPr>
         <p:spPr>
           <a:xfrm>
-            <a:off x="5908024" y="4655110"/>
+            <a:off x="7331352" y="4690531"/>
             <a:ext cx="1373325" cy="461665"/>
           </a:xfrm>
           <a:prstGeom prst="rect">
@@ -41451,9 +41452,9 @@
           <p:nvPr/>
         </p:nvCxnSpPr>
         <p:spPr bwMode="auto">
-          <a:xfrm flipV="1">
-            <a:off x="5559958" y="4885943"/>
-            <a:ext cx="348066" cy="11320"/>
+          <a:xfrm>
+            <a:off x="6615342" y="4919177"/>
+            <a:ext cx="716010" cy="2187"/>
           </a:xfrm>
           <a:prstGeom prst="line">
             <a:avLst/>
@@ -41489,7 +41490,7 @@
         </p:nvCxnSpPr>
         <p:spPr bwMode="auto">
           <a:xfrm>
-            <a:off x="1104167" y="4401011"/>
+            <a:off x="381000" y="4457118"/>
             <a:ext cx="0" cy="1085389"/>
           </a:xfrm>
           <a:prstGeom prst="line">
@@ -41630,13 +41631,15 @@
               </a:ext>
             </a:extLst>
           </p:cNvPr>
-          <p:cNvCxnSpPr/>
+          <p:cNvCxnSpPr>
+            <a:cxnSpLocks/>
+          </p:cNvCxnSpPr>
           <p:nvPr/>
         </p:nvCxnSpPr>
         <p:spPr bwMode="auto">
           <a:xfrm>
-            <a:off x="6557528" y="4152745"/>
-            <a:ext cx="0" cy="1466389"/>
+            <a:off x="6557528" y="4406920"/>
+            <a:ext cx="0" cy="904425"/>
           </a:xfrm>
           <a:prstGeom prst="line">
             <a:avLst/>
@@ -41693,10 +41696,10 @@
       </p:cxnSp>
       <p:sp>
         <p:nvSpPr>
-          <p:cNvPr id="89" name="TextBox 88">
-            <a:extLst>
-              <a:ext uri="{FF2B5EF4-FFF2-40B4-BE49-F238E27FC236}">
-                <a16:creationId xmlns:a16="http://schemas.microsoft.com/office/drawing/2014/main" id="{D995A8B4-279C-35B9-48D5-FBB8F2C55FEF}"/>
+          <p:cNvPr id="90" name="TextBox 89">
+            <a:extLst>
+              <a:ext uri="{FF2B5EF4-FFF2-40B4-BE49-F238E27FC236}">
+                <a16:creationId xmlns:a16="http://schemas.microsoft.com/office/drawing/2014/main" id="{14D956A6-7C8D-F4EC-555F-2536602404A5}"/>
               </a:ext>
             </a:extLst>
           </p:cNvPr>
@@ -41705,44 +41708,8 @@
         </p:nvSpPr>
         <p:spPr>
           <a:xfrm>
-            <a:off x="7333303" y="4607747"/>
-            <a:ext cx="1613775" cy="461665"/>
-          </a:xfrm>
-          <a:prstGeom prst="rect">
-            <a:avLst/>
-          </a:prstGeom>
-          <a:noFill/>
-        </p:spPr>
-        <p:txBody>
-          <a:bodyPr wrap="none" rtlCol="0">
-            <a:spAutoFit/>
-          </a:bodyPr>
-          <a:lstStyle/>
-          <a:p>
-            <a:r>
-              <a:rPr lang="en-US" dirty="0" err="1"/>
-              <a:t>Reg_begin</a:t>
-            </a:r>
-            <a:endParaRPr lang="en-US" dirty="0"/>
-          </a:p>
-        </p:txBody>
-      </p:sp>
-      <p:sp>
-        <p:nvSpPr>
-          <p:cNvPr id="90" name="TextBox 89">
-            <a:extLst>
-              <a:ext uri="{FF2B5EF4-FFF2-40B4-BE49-F238E27FC236}">
-                <a16:creationId xmlns:a16="http://schemas.microsoft.com/office/drawing/2014/main" id="{14D956A6-7C8D-F4EC-555F-2536602404A5}"/>
-              </a:ext>
-            </a:extLst>
-          </p:cNvPr>
-          <p:cNvSpPr txBox="1"/>
-          <p:nvPr/>
-        </p:nvSpPr>
-        <p:spPr>
-          <a:xfrm>
-            <a:off x="297279" y="3761723"/>
-            <a:ext cx="1613776" cy="769441"/>
+            <a:off x="228375" y="3839640"/>
+            <a:ext cx="2516811" cy="415498"/>
           </a:xfrm>
           <a:prstGeom prst="rect">
             <a:avLst/>
@@ -41756,8 +41723,8 @@
           <a:lstStyle/>
           <a:p>
             <a:r>
-              <a:rPr lang="en-US" sz="1100" dirty="0"/>
-              <a:t>There are no frame preconditions relevant for the DISPLAY TEMP function</a:t>
+              <a:rPr lang="en-US" sz="700" dirty="0"/>
+              <a:t>There are no frame preconditions relevant for the DISPLAY TEMP function .. BUT MRI and MHS have pre-conditions on lower/upper desired that must be established</a:t>
             </a:r>
           </a:p>
         </p:txBody>
@@ -41776,7 +41743,7 @@
         </p:nvSpPr>
         <p:spPr>
           <a:xfrm>
-            <a:off x="716280" y="5499285"/>
+            <a:off x="15023" y="5538964"/>
             <a:ext cx="918841" cy="230832"/>
           </a:xfrm>
           <a:prstGeom prst="rect">
@@ -42008,41 +41975,6 @@
       </p:sp>
       <p:sp>
         <p:nvSpPr>
-          <p:cNvPr id="101" name="TextBox 100">
-            <a:extLst>
-              <a:ext uri="{FF2B5EF4-FFF2-40B4-BE49-F238E27FC236}">
-                <a16:creationId xmlns:a16="http://schemas.microsoft.com/office/drawing/2014/main" id="{6846D21D-B1B6-7B8A-C0D3-C698A2EB7DFE}"/>
-              </a:ext>
-            </a:extLst>
-          </p:cNvPr>
-          <p:cNvSpPr txBox="1"/>
-          <p:nvPr/>
-        </p:nvSpPr>
-        <p:spPr>
-          <a:xfrm>
-            <a:off x="6764342" y="4402714"/>
-            <a:ext cx="966931" cy="261610"/>
-          </a:xfrm>
-          <a:prstGeom prst="rect">
-            <a:avLst/>
-          </a:prstGeom>
-          <a:noFill/>
-        </p:spPr>
-        <p:txBody>
-          <a:bodyPr wrap="none" rtlCol="0">
-            <a:spAutoFit/>
-          </a:bodyPr>
-          <a:lstStyle/>
-          <a:p>
-            <a:r>
-              <a:rPr lang="en-US" sz="1100" i="1" dirty="0"/>
-              <a:t>..new cycle..</a:t>
-            </a:r>
-          </a:p>
-        </p:txBody>
-      </p:sp>
-      <p:sp>
-        <p:nvSpPr>
           <p:cNvPr id="102" name="TextBox 101">
             <a:extLst>
               <a:ext uri="{FF2B5EF4-FFF2-40B4-BE49-F238E27FC236}">
@@ -42422,7 +42354,7 @@
         </p:nvSpPr>
         <p:spPr>
           <a:xfrm>
-            <a:off x="6409232" y="5608903"/>
+            <a:off x="7658006" y="5588681"/>
             <a:ext cx="829073" cy="230832"/>
           </a:xfrm>
           <a:prstGeom prst="rect">
@@ -42443,50 +42375,6 @@
                 </a:solidFill>
               </a:rPr>
               <a:t>Reg_end_SA</a:t>
-            </a:r>
-            <a:endParaRPr lang="en-US" sz="900" dirty="0">
-              <a:solidFill>
-                <a:srgbClr val="C00000"/>
-              </a:solidFill>
-            </a:endParaRPr>
-          </a:p>
-        </p:txBody>
-      </p:sp>
-      <p:sp>
-        <p:nvSpPr>
-          <p:cNvPr id="112" name="TextBox 111">
-            <a:extLst>
-              <a:ext uri="{FF2B5EF4-FFF2-40B4-BE49-F238E27FC236}">
-                <a16:creationId xmlns:a16="http://schemas.microsoft.com/office/drawing/2014/main" id="{40B02050-5FBA-97BB-0B31-B5F52465FB03}"/>
-              </a:ext>
-            </a:extLst>
-          </p:cNvPr>
-          <p:cNvSpPr txBox="1"/>
-          <p:nvPr/>
-        </p:nvSpPr>
-        <p:spPr>
-          <a:xfrm>
-            <a:off x="7797159" y="5588681"/>
-            <a:ext cx="918841" cy="230832"/>
-          </a:xfrm>
-          <a:prstGeom prst="rect">
-            <a:avLst/>
-          </a:prstGeom>
-          <a:noFill/>
-        </p:spPr>
-        <p:txBody>
-          <a:bodyPr wrap="none" rtlCol="0">
-            <a:spAutoFit/>
-          </a:bodyPr>
-          <a:lstStyle/>
-          <a:p>
-            <a:r>
-              <a:rPr lang="en-US" sz="900" dirty="0" err="1">
-                <a:solidFill>
-                  <a:srgbClr val="C00000"/>
-                </a:solidFill>
-              </a:rPr>
-              <a:t>Reg_begin_SA</a:t>
             </a:r>
             <a:endParaRPr lang="en-US" sz="900" dirty="0">
               <a:solidFill>
@@ -42720,12 +42608,51 @@
           <a:effectLst/>
         </p:spPr>
       </p:cxnSp>
+      <p:sp>
+        <p:nvSpPr>
+          <p:cNvPr id="120" name="TextBox 119">
+            <a:extLst>
+              <a:ext uri="{FF2B5EF4-FFF2-40B4-BE49-F238E27FC236}">
+                <a16:creationId xmlns:a16="http://schemas.microsoft.com/office/drawing/2014/main" id="{0AD5E49B-B4BA-A2A4-C550-9D8D69C0C3D7}"/>
+              </a:ext>
+            </a:extLst>
+          </p:cNvPr>
+          <p:cNvSpPr txBox="1"/>
+          <p:nvPr/>
+        </p:nvSpPr>
+        <p:spPr>
+          <a:xfrm>
+            <a:off x="4114102" y="6100718"/>
+            <a:ext cx="1995421" cy="600164"/>
+          </a:xfrm>
+          <a:prstGeom prst="rect">
+            <a:avLst/>
+          </a:prstGeom>
+          <a:noFill/>
+        </p:spPr>
+        <p:txBody>
+          <a:bodyPr wrap="square" rtlCol="0">
+            <a:spAutoFit/>
+          </a:bodyPr>
+          <a:lstStyle/>
+          <a:p>
+            <a:r>
+              <a:rPr lang="en-US" sz="1100" i="1" dirty="0" err="1"/>
+              <a:t>Display_Temp_Fun</a:t>
+            </a:r>
+            <a:r>
+              <a:rPr lang="en-US" sz="1100" i="1" dirty="0"/>
+              <a:t> property is preserved via component frame conditions here…</a:t>
+            </a:r>
+          </a:p>
+        </p:txBody>
+      </p:sp>
       <p:cxnSp>
         <p:nvCxnSpPr>
-          <p:cNvPr id="119" name="Straight Connector 118">
-            <a:extLst>
-              <a:ext uri="{FF2B5EF4-FFF2-40B4-BE49-F238E27FC236}">
-                <a16:creationId xmlns:a16="http://schemas.microsoft.com/office/drawing/2014/main" id="{14E6362A-BEC4-C737-F36F-B4A0F7B32B9A}"/>
+          <p:cNvPr id="121" name="Straight Connector 120">
+            <a:extLst>
+              <a:ext uri="{FF2B5EF4-FFF2-40B4-BE49-F238E27FC236}">
+                <a16:creationId xmlns:a16="http://schemas.microsoft.com/office/drawing/2014/main" id="{044BF567-AAB1-ED81-0344-1F29D7341197}"/>
               </a:ext>
             </a:extLst>
           </p:cNvPr>
@@ -42735,9 +42662,359 @@
           <p:nvPr/>
         </p:nvCxnSpPr>
         <p:spPr bwMode="auto">
+          <a:xfrm flipH="1" flipV="1">
+            <a:off x="4586275" y="5517628"/>
+            <a:ext cx="368178" cy="578372"/>
+          </a:xfrm>
+          <a:prstGeom prst="line">
+            <a:avLst/>
+          </a:prstGeom>
+          <a:solidFill>
+            <a:schemeClr val="accent1"/>
+          </a:solidFill>
+          <a:ln w="9525" cap="flat" cmpd="sng" algn="ctr">
+            <a:solidFill>
+              <a:schemeClr val="tx1"/>
+            </a:solidFill>
+            <a:prstDash val="dash"/>
+            <a:miter lim="800000"/>
+            <a:headEnd type="none" w="med" len="med"/>
+            <a:tailEnd type="none" w="med" len="med"/>
+          </a:ln>
+          <a:effectLst/>
+        </p:spPr>
+      </p:cxnSp>
+      <p:cxnSp>
+        <p:nvCxnSpPr>
+          <p:cNvPr id="123" name="Straight Connector 122">
+            <a:extLst>
+              <a:ext uri="{FF2B5EF4-FFF2-40B4-BE49-F238E27FC236}">
+                <a16:creationId xmlns:a16="http://schemas.microsoft.com/office/drawing/2014/main" id="{F8D10CCA-1170-CB7A-00D0-93645B23106D}"/>
+              </a:ext>
+            </a:extLst>
+          </p:cNvPr>
+          <p:cNvCxnSpPr>
+            <a:cxnSpLocks/>
+          </p:cNvCxnSpPr>
+          <p:nvPr/>
+        </p:nvCxnSpPr>
+        <p:spPr bwMode="auto">
           <a:xfrm flipV="1">
-            <a:off x="7094728" y="5065700"/>
-            <a:ext cx="348066" cy="11320"/>
+            <a:off x="5579876" y="5530327"/>
+            <a:ext cx="218132" cy="565673"/>
+          </a:xfrm>
+          <a:prstGeom prst="line">
+            <a:avLst/>
+          </a:prstGeom>
+          <a:solidFill>
+            <a:schemeClr val="accent1"/>
+          </a:solidFill>
+          <a:ln w="9525" cap="flat" cmpd="sng" algn="ctr">
+            <a:solidFill>
+              <a:schemeClr val="tx1"/>
+            </a:solidFill>
+            <a:prstDash val="dash"/>
+            <a:miter lim="800000"/>
+            <a:headEnd type="none" w="med" len="med"/>
+            <a:tailEnd type="none" w="med" len="med"/>
+          </a:ln>
+          <a:effectLst/>
+        </p:spPr>
+      </p:cxnSp>
+      <p:sp>
+        <p:nvSpPr>
+          <p:cNvPr id="126" name="TextBox 125">
+            <a:extLst>
+              <a:ext uri="{FF2B5EF4-FFF2-40B4-BE49-F238E27FC236}">
+                <a16:creationId xmlns:a16="http://schemas.microsoft.com/office/drawing/2014/main" id="{4ED70DAC-E61A-AA4E-BE7F-3BD023ADD119}"/>
+              </a:ext>
+            </a:extLst>
+          </p:cNvPr>
+          <p:cNvSpPr txBox="1"/>
+          <p:nvPr/>
+        </p:nvSpPr>
+        <p:spPr>
+          <a:xfrm>
+            <a:off x="6268163" y="6101680"/>
+            <a:ext cx="1656637" cy="600164"/>
+          </a:xfrm>
+          <a:prstGeom prst="rect">
+            <a:avLst/>
+          </a:prstGeom>
+          <a:noFill/>
+        </p:spPr>
+        <p:txBody>
+          <a:bodyPr wrap="square" rtlCol="0">
+            <a:spAutoFit/>
+          </a:bodyPr>
+          <a:lstStyle/>
+          <a:p>
+            <a:r>
+              <a:rPr lang="en-US" sz="1100" i="1" dirty="0" err="1"/>
+              <a:t>Display_Temp_Fun</a:t>
+            </a:r>
+            <a:r>
+              <a:rPr lang="en-US" sz="1100" i="1" dirty="0"/>
+              <a:t> property holds at the end of the cycle</a:t>
+            </a:r>
+          </a:p>
+        </p:txBody>
+      </p:sp>
+      <p:cxnSp>
+        <p:nvCxnSpPr>
+          <p:cNvPr id="127" name="Straight Connector 126">
+            <a:extLst>
+              <a:ext uri="{FF2B5EF4-FFF2-40B4-BE49-F238E27FC236}">
+                <a16:creationId xmlns:a16="http://schemas.microsoft.com/office/drawing/2014/main" id="{4E42140B-9B43-39D8-E15F-C9791153BE5E}"/>
+              </a:ext>
+            </a:extLst>
+          </p:cNvPr>
+          <p:cNvCxnSpPr>
+            <a:cxnSpLocks/>
+          </p:cNvCxnSpPr>
+          <p:nvPr/>
+        </p:nvCxnSpPr>
+        <p:spPr bwMode="auto">
+          <a:xfrm flipH="1" flipV="1">
+            <a:off x="6734635" y="5828425"/>
+            <a:ext cx="199565" cy="282837"/>
+          </a:xfrm>
+          <a:prstGeom prst="line">
+            <a:avLst/>
+          </a:prstGeom>
+          <a:solidFill>
+            <a:schemeClr val="accent1"/>
+          </a:solidFill>
+          <a:ln w="9525" cap="flat" cmpd="sng" algn="ctr">
+            <a:solidFill>
+              <a:schemeClr val="tx1"/>
+            </a:solidFill>
+            <a:prstDash val="dash"/>
+            <a:miter lim="800000"/>
+            <a:headEnd type="none" w="med" len="med"/>
+            <a:tailEnd type="none" w="med" len="med"/>
+          </a:ln>
+          <a:effectLst/>
+        </p:spPr>
+      </p:cxnSp>
+      <p:cxnSp>
+        <p:nvCxnSpPr>
+          <p:cNvPr id="131" name="Straight Connector 130">
+            <a:extLst>
+              <a:ext uri="{FF2B5EF4-FFF2-40B4-BE49-F238E27FC236}">
+                <a16:creationId xmlns:a16="http://schemas.microsoft.com/office/drawing/2014/main" id="{BD444EDD-EB33-7234-9D68-4418D7E0CE65}"/>
+              </a:ext>
+            </a:extLst>
+          </p:cNvPr>
+          <p:cNvCxnSpPr>
+            <a:cxnSpLocks/>
+          </p:cNvCxnSpPr>
+          <p:nvPr/>
+        </p:nvCxnSpPr>
+        <p:spPr bwMode="auto">
+          <a:xfrm>
+            <a:off x="3249049" y="5089682"/>
+            <a:ext cx="0" cy="570841"/>
+          </a:xfrm>
+          <a:prstGeom prst="line">
+            <a:avLst/>
+          </a:prstGeom>
+          <a:solidFill>
+            <a:schemeClr val="accent1"/>
+          </a:solidFill>
+          <a:ln w="38100" cap="flat" cmpd="sng" algn="ctr">
+            <a:solidFill>
+              <a:srgbClr val="C00000"/>
+            </a:solidFill>
+            <a:prstDash val="solid"/>
+            <a:miter lim="800000"/>
+            <a:headEnd type="none" w="med" len="med"/>
+            <a:tailEnd type="none" w="med" len="med"/>
+          </a:ln>
+          <a:effectLst/>
+        </p:spPr>
+      </p:cxnSp>
+      <p:sp>
+        <p:nvSpPr>
+          <p:cNvPr id="132" name="TextBox 131">
+            <a:extLst>
+              <a:ext uri="{FF2B5EF4-FFF2-40B4-BE49-F238E27FC236}">
+                <a16:creationId xmlns:a16="http://schemas.microsoft.com/office/drawing/2014/main" id="{9F95FD96-4479-865E-6E4A-8560A38E2837}"/>
+              </a:ext>
+            </a:extLst>
+          </p:cNvPr>
+          <p:cNvSpPr txBox="1"/>
+          <p:nvPr/>
+        </p:nvSpPr>
+        <p:spPr>
+          <a:xfrm>
+            <a:off x="2518430" y="4715217"/>
+            <a:ext cx="330540" cy="461665"/>
+          </a:xfrm>
+          <a:prstGeom prst="rect">
+            <a:avLst/>
+          </a:prstGeom>
+          <a:noFill/>
+        </p:spPr>
+        <p:txBody>
+          <a:bodyPr wrap="none" rtlCol="0">
+            <a:spAutoFit/>
+          </a:bodyPr>
+          <a:lstStyle/>
+          <a:p>
+            <a:r>
+              <a:rPr lang="en-US" dirty="0">
+                <a:solidFill>
+                  <a:schemeClr val="tx2">
+                    <a:lumMod val="60000"/>
+                    <a:lumOff val="40000"/>
+                  </a:schemeClr>
+                </a:solidFill>
+              </a:rPr>
+              <a:t>?</a:t>
+            </a:r>
+          </a:p>
+        </p:txBody>
+      </p:sp>
+      <p:sp>
+        <p:nvSpPr>
+          <p:cNvPr id="133" name="TextBox 132">
+            <a:extLst>
+              <a:ext uri="{FF2B5EF4-FFF2-40B4-BE49-F238E27FC236}">
+                <a16:creationId xmlns:a16="http://schemas.microsoft.com/office/drawing/2014/main" id="{CB111D86-EBBC-500E-F76B-FB36E1E46476}"/>
+              </a:ext>
+            </a:extLst>
+          </p:cNvPr>
+          <p:cNvSpPr txBox="1"/>
+          <p:nvPr/>
+        </p:nvSpPr>
+        <p:spPr>
+          <a:xfrm>
+            <a:off x="812957" y="4792413"/>
+            <a:ext cx="1345368" cy="276999"/>
+          </a:xfrm>
+          <a:prstGeom prst="rect">
+            <a:avLst/>
+          </a:prstGeom>
+          <a:noFill/>
+        </p:spPr>
+        <p:txBody>
+          <a:bodyPr wrap="none" rtlCol="0">
+            <a:spAutoFit/>
+          </a:bodyPr>
+          <a:lstStyle/>
+          <a:p>
+            <a:r>
+              <a:rPr lang="en-US" sz="1200" dirty="0" err="1"/>
+              <a:t>DisplayTemp_pre</a:t>
+            </a:r>
+            <a:endParaRPr lang="en-US" sz="1200" dirty="0"/>
+          </a:p>
+        </p:txBody>
+      </p:sp>
+      <p:cxnSp>
+        <p:nvCxnSpPr>
+          <p:cNvPr id="134" name="Straight Connector 133">
+            <a:extLst>
+              <a:ext uri="{FF2B5EF4-FFF2-40B4-BE49-F238E27FC236}">
+                <a16:creationId xmlns:a16="http://schemas.microsoft.com/office/drawing/2014/main" id="{C6A1D736-FC79-5887-C3C7-0D325ECD2761}"/>
+              </a:ext>
+            </a:extLst>
+          </p:cNvPr>
+          <p:cNvCxnSpPr>
+            <a:cxnSpLocks/>
+          </p:cNvCxnSpPr>
+          <p:nvPr/>
+        </p:nvCxnSpPr>
+        <p:spPr bwMode="auto">
+          <a:xfrm>
+            <a:off x="1495640" y="4413039"/>
+            <a:ext cx="0" cy="1085389"/>
+          </a:xfrm>
+          <a:prstGeom prst="line">
+            <a:avLst/>
+          </a:prstGeom>
+          <a:solidFill>
+            <a:schemeClr val="accent1"/>
+          </a:solidFill>
+          <a:ln w="38100" cap="flat" cmpd="sng" algn="ctr">
+            <a:solidFill>
+              <a:srgbClr val="C00000"/>
+            </a:solidFill>
+            <a:prstDash val="solid"/>
+            <a:miter lim="800000"/>
+            <a:headEnd type="none" w="med" len="med"/>
+            <a:tailEnd type="none" w="med" len="med"/>
+          </a:ln>
+          <a:effectLst/>
+        </p:spPr>
+      </p:cxnSp>
+      <p:sp>
+        <p:nvSpPr>
+          <p:cNvPr id="135" name="TextBox 134">
+            <a:extLst>
+              <a:ext uri="{FF2B5EF4-FFF2-40B4-BE49-F238E27FC236}">
+                <a16:creationId xmlns:a16="http://schemas.microsoft.com/office/drawing/2014/main" id="{674466CA-0367-9322-AD4D-7F95FC0E2CC6}"/>
+              </a:ext>
+            </a:extLst>
+          </p:cNvPr>
+          <p:cNvSpPr txBox="1"/>
+          <p:nvPr/>
+        </p:nvSpPr>
+        <p:spPr>
+          <a:xfrm>
+            <a:off x="650547" y="5066270"/>
+            <a:ext cx="1376102" cy="369332"/>
+          </a:xfrm>
+          <a:prstGeom prst="rect">
+            <a:avLst/>
+          </a:prstGeom>
+          <a:noFill/>
+        </p:spPr>
+        <p:txBody>
+          <a:bodyPr wrap="square" rtlCol="0">
+            <a:spAutoFit/>
+          </a:bodyPr>
+          <a:lstStyle/>
+          <a:p>
+            <a:r>
+              <a:rPr lang="en-US" sz="600" dirty="0"/>
+              <a:t>Log pre-state values </a:t>
+            </a:r>
+            <a:r>
+              <a:rPr lang="en-US" sz="600" dirty="0" err="1"/>
+              <a:t>current_tempWstatus</a:t>
+            </a:r>
+            <a:r>
+              <a:rPr lang="en-US" sz="600" dirty="0"/>
+              <a:t> and </a:t>
+            </a:r>
+            <a:r>
+              <a:rPr lang="en-US" sz="600" dirty="0" err="1"/>
+              <a:t>last_regulator_mode</a:t>
+            </a:r>
+            <a:endParaRPr lang="en-US" sz="600" dirty="0"/>
+          </a:p>
+        </p:txBody>
+      </p:sp>
+      <p:cxnSp>
+        <p:nvCxnSpPr>
+          <p:cNvPr id="136" name="Straight Connector 135">
+            <a:extLst>
+              <a:ext uri="{FF2B5EF4-FFF2-40B4-BE49-F238E27FC236}">
+                <a16:creationId xmlns:a16="http://schemas.microsoft.com/office/drawing/2014/main" id="{FF3ACAF0-BE17-8525-A583-24C4100CCDD6}"/>
+              </a:ext>
+            </a:extLst>
+          </p:cNvPr>
+          <p:cNvCxnSpPr>
+            <a:cxnSpLocks/>
+          </p:cNvCxnSpPr>
+          <p:nvPr/>
+        </p:nvCxnSpPr>
+        <p:spPr bwMode="auto">
+          <a:xfrm flipV="1">
+            <a:off x="461692" y="4708554"/>
+            <a:ext cx="861576" cy="6663"/>
           </a:xfrm>
           <a:prstGeom prst="line">
             <a:avLst/>
@@ -42759,10 +43036,10 @@
       </p:cxnSp>
       <p:sp>
         <p:nvSpPr>
-          <p:cNvPr id="120" name="TextBox 119">
-            <a:extLst>
-              <a:ext uri="{FF2B5EF4-FFF2-40B4-BE49-F238E27FC236}">
-                <a16:creationId xmlns:a16="http://schemas.microsoft.com/office/drawing/2014/main" id="{0AD5E49B-B4BA-A2A4-C550-9D8D69C0C3D7}"/>
+          <p:cNvPr id="139" name="TextBox 138">
+            <a:extLst>
+              <a:ext uri="{FF2B5EF4-FFF2-40B4-BE49-F238E27FC236}">
+                <a16:creationId xmlns:a16="http://schemas.microsoft.com/office/drawing/2014/main" id="{0EC59490-6421-55B8-F97B-835485638B7B}"/>
               </a:ext>
             </a:extLst>
           </p:cNvPr>
@@ -42771,8 +43048,8 @@
         </p:nvSpPr>
         <p:spPr>
           <a:xfrm>
-            <a:off x="4114102" y="6100718"/>
-            <a:ext cx="1995421" cy="600164"/>
+            <a:off x="6036103" y="4774939"/>
+            <a:ext cx="655177" cy="369332"/>
           </a:xfrm>
           <a:prstGeom prst="rect">
             <a:avLst/>
@@ -42786,22 +43063,23 @@
           <a:lstStyle/>
           <a:p>
             <a:r>
-              <a:rPr lang="en-US" sz="1100" i="1" dirty="0" err="1"/>
-              <a:t>Display_Temp_Fun</a:t>
-            </a:r>
-            <a:r>
-              <a:rPr lang="en-US" sz="1100" i="1" dirty="0"/>
-              <a:t> property is preserved via component frame conditions here…</a:t>
-            </a:r>
+              <a:rPr lang="en-US" sz="600" dirty="0"/>
+              <a:t>Log post-state values </a:t>
+            </a:r>
+            <a:r>
+              <a:rPr lang="en-US" sz="600" dirty="0" err="1"/>
+              <a:t>displayTemp</a:t>
+            </a:r>
+            <a:endParaRPr lang="en-US" sz="600" dirty="0"/>
           </a:p>
         </p:txBody>
       </p:sp>
       <p:cxnSp>
         <p:nvCxnSpPr>
-          <p:cNvPr id="121" name="Straight Connector 120">
-            <a:extLst>
-              <a:ext uri="{FF2B5EF4-FFF2-40B4-BE49-F238E27FC236}">
-                <a16:creationId xmlns:a16="http://schemas.microsoft.com/office/drawing/2014/main" id="{044BF567-AAB1-ED81-0344-1F29D7341197}"/>
+          <p:cNvPr id="144" name="Straight Connector 143">
+            <a:extLst>
+              <a:ext uri="{FF2B5EF4-FFF2-40B4-BE49-F238E27FC236}">
+                <a16:creationId xmlns:a16="http://schemas.microsoft.com/office/drawing/2014/main" id="{4608712F-F6AC-E266-576F-C7E04C77B881}"/>
               </a:ext>
             </a:extLst>
           </p:cNvPr>
@@ -42811,11 +43089,82 @@
           <p:nvPr/>
         </p:nvCxnSpPr>
         <p:spPr bwMode="auto">
-          <a:xfrm flipH="1" flipV="1">
-            <a:off x="4586275" y="5517628"/>
-            <a:ext cx="368178" cy="578372"/>
+          <a:xfrm>
+            <a:off x="5751682" y="4916990"/>
+            <a:ext cx="716010" cy="2187"/>
           </a:xfrm>
           <a:prstGeom prst="line">
+            <a:avLst/>
+          </a:prstGeom>
+          <a:solidFill>
+            <a:schemeClr val="accent1"/>
+          </a:solidFill>
+          <a:ln w="9525" cap="flat" cmpd="sng" algn="ctr">
+            <a:solidFill>
+              <a:srgbClr val="00B050"/>
+            </a:solidFill>
+            <a:prstDash val="dash"/>
+            <a:miter lim="800000"/>
+            <a:headEnd type="none" w="med" len="med"/>
+            <a:tailEnd type="none" w="med" len="med"/>
+          </a:ln>
+          <a:effectLst/>
+        </p:spPr>
+      </p:cxnSp>
+      <p:sp>
+        <p:nvSpPr>
+          <p:cNvPr id="145" name="TextBox 144">
+            <a:extLst>
+              <a:ext uri="{FF2B5EF4-FFF2-40B4-BE49-F238E27FC236}">
+                <a16:creationId xmlns:a16="http://schemas.microsoft.com/office/drawing/2014/main" id="{E901524D-0569-FFE7-95CA-FBC13AD2F2E9}"/>
+              </a:ext>
+            </a:extLst>
+          </p:cNvPr>
+          <p:cNvSpPr txBox="1"/>
+          <p:nvPr/>
+        </p:nvSpPr>
+        <p:spPr>
+          <a:xfrm>
+            <a:off x="5967040" y="4550565"/>
+            <a:ext cx="1411861" cy="276999"/>
+          </a:xfrm>
+          <a:prstGeom prst="rect">
+            <a:avLst/>
+          </a:prstGeom>
+          <a:noFill/>
+        </p:spPr>
+        <p:txBody>
+          <a:bodyPr wrap="none" rtlCol="0">
+            <a:spAutoFit/>
+          </a:bodyPr>
+          <a:lstStyle/>
+          <a:p>
+            <a:r>
+              <a:rPr lang="en-US" sz="1200" dirty="0" err="1"/>
+              <a:t>DisplayTemp_post</a:t>
+            </a:r>
+            <a:endParaRPr lang="en-US" sz="1200" dirty="0"/>
+          </a:p>
+        </p:txBody>
+      </p:sp>
+      <p:sp>
+        <p:nvSpPr>
+          <p:cNvPr id="147" name="Oval 146">
+            <a:extLst>
+              <a:ext uri="{FF2B5EF4-FFF2-40B4-BE49-F238E27FC236}">
+                <a16:creationId xmlns:a16="http://schemas.microsoft.com/office/drawing/2014/main" id="{C22FBEA8-E160-1197-2020-520D35497B20}"/>
+              </a:ext>
+            </a:extLst>
+          </p:cNvPr>
+          <p:cNvSpPr/>
+          <p:nvPr/>
+        </p:nvSpPr>
+        <p:spPr bwMode="auto">
+          <a:xfrm>
+            <a:off x="2278624" y="5192636"/>
+            <a:ext cx="138051" cy="127033"/>
+          </a:xfrm>
+          <a:prstGeom prst="ellipse">
             <a:avLst/>
           </a:prstGeom>
           <a:solidFill>
@@ -42825,34 +43174,68 @@
             <a:solidFill>
               <a:schemeClr val="tx1"/>
             </a:solidFill>
-            <a:prstDash val="dash"/>
+            <a:prstDash val="solid"/>
             <a:miter lim="800000"/>
             <a:headEnd type="none" w="med" len="med"/>
             <a:tailEnd type="none" w="med" len="med"/>
           </a:ln>
           <a:effectLst/>
         </p:spPr>
-      </p:cxnSp>
-      <p:cxnSp>
-        <p:nvCxnSpPr>
-          <p:cNvPr id="123" name="Straight Connector 122">
-            <a:extLst>
-              <a:ext uri="{FF2B5EF4-FFF2-40B4-BE49-F238E27FC236}">
-                <a16:creationId xmlns:a16="http://schemas.microsoft.com/office/drawing/2014/main" id="{F8D10CCA-1170-CB7A-00D0-93645B23106D}"/>
-              </a:ext>
-            </a:extLst>
-          </p:cNvPr>
-          <p:cNvCxnSpPr>
-            <a:cxnSpLocks/>
-          </p:cNvCxnSpPr>
-          <p:nvPr/>
-        </p:nvCxnSpPr>
+        <p:txBody>
+          <a:bodyPr vert="horz" wrap="none" lIns="91440" tIns="45720" rIns="91440" bIns="45720" numCol="1" rtlCol="0" anchor="t" anchorCtr="0" compatLnSpc="1">
+            <a:prstTxWarp prst="textNoShape">
+              <a:avLst/>
+            </a:prstTxWarp>
+          </a:bodyPr>
+          <a:lstStyle/>
+          <a:p>
+            <a:pPr marL="0" marR="0" indent="0" algn="l" defTabSz="914400" rtl="0" eaLnBrk="1" fontAlgn="base" latinLnBrk="0" hangingPunct="1">
+              <a:lnSpc>
+                <a:spcPct val="100000"/>
+              </a:lnSpc>
+              <a:spcBef>
+                <a:spcPct val="0"/>
+              </a:spcBef>
+              <a:spcAft>
+                <a:spcPct val="0"/>
+              </a:spcAft>
+              <a:buClrTx/>
+              <a:buSzTx/>
+              <a:buFontTx/>
+              <a:buNone/>
+              <a:tabLst/>
+            </a:pPr>
+            <a:endParaRPr kumimoji="0" lang="en-US" sz="2400" b="0" i="0" u="none" strike="noStrike" cap="none" normalizeH="0" baseline="0">
+              <a:ln>
+                <a:noFill/>
+              </a:ln>
+              <a:solidFill>
+                <a:schemeClr val="tx1"/>
+              </a:solidFill>
+              <a:effectLst/>
+              <a:latin typeface="Tahoma" charset="0"/>
+            </a:endParaRPr>
+          </a:p>
+        </p:txBody>
+      </p:sp>
+      <p:sp>
+        <p:nvSpPr>
+          <p:cNvPr id="148" name="Oval 147">
+            <a:extLst>
+              <a:ext uri="{FF2B5EF4-FFF2-40B4-BE49-F238E27FC236}">
+                <a16:creationId xmlns:a16="http://schemas.microsoft.com/office/drawing/2014/main" id="{52F298C2-3A29-A1A5-7C6C-F8AD5C998417}"/>
+              </a:ext>
+            </a:extLst>
+          </p:cNvPr>
+          <p:cNvSpPr/>
+          <p:nvPr/>
+        </p:nvSpPr>
         <p:spPr bwMode="auto">
-          <a:xfrm flipV="1">
-            <a:off x="5579876" y="5530327"/>
-            <a:ext cx="218132" cy="565673"/>
-          </a:xfrm>
-          <a:prstGeom prst="line">
+          <a:xfrm>
+            <a:off x="4707531" y="4651700"/>
+            <a:ext cx="138051" cy="127033"/>
+          </a:xfrm>
+          <a:prstGeom prst="ellipse">
             <a:avLst/>
           </a:prstGeom>
           <a:solidFill>
@@ -42862,119 +43245,6 @@
             <a:solidFill>
               <a:schemeClr val="tx1"/>
             </a:solidFill>
-            <a:prstDash val="dash"/>
-            <a:miter lim="800000"/>
-            <a:headEnd type="none" w="med" len="med"/>
-            <a:tailEnd type="none" w="med" len="med"/>
-          </a:ln>
-          <a:effectLst/>
-        </p:spPr>
-      </p:cxnSp>
-      <p:sp>
-        <p:nvSpPr>
-          <p:cNvPr id="126" name="TextBox 125">
-            <a:extLst>
-              <a:ext uri="{FF2B5EF4-FFF2-40B4-BE49-F238E27FC236}">
-                <a16:creationId xmlns:a16="http://schemas.microsoft.com/office/drawing/2014/main" id="{4ED70DAC-E61A-AA4E-BE7F-3BD023ADD119}"/>
-              </a:ext>
-            </a:extLst>
-          </p:cNvPr>
-          <p:cNvSpPr txBox="1"/>
-          <p:nvPr/>
-        </p:nvSpPr>
-        <p:spPr>
-          <a:xfrm>
-            <a:off x="6268163" y="6101680"/>
-            <a:ext cx="1656637" cy="600164"/>
-          </a:xfrm>
-          <a:prstGeom prst="rect">
-            <a:avLst/>
-          </a:prstGeom>
-          <a:noFill/>
-        </p:spPr>
-        <p:txBody>
-          <a:bodyPr wrap="square" rtlCol="0">
-            <a:spAutoFit/>
-          </a:bodyPr>
-          <a:lstStyle/>
-          <a:p>
-            <a:r>
-              <a:rPr lang="en-US" sz="1100" i="1" dirty="0" err="1"/>
-              <a:t>Display_Temp_Fun</a:t>
-            </a:r>
-            <a:r>
-              <a:rPr lang="en-US" sz="1100" i="1" dirty="0"/>
-              <a:t> property holds at the end of the cycle</a:t>
-            </a:r>
-          </a:p>
-        </p:txBody>
-      </p:sp>
-      <p:cxnSp>
-        <p:nvCxnSpPr>
-          <p:cNvPr id="127" name="Straight Connector 126">
-            <a:extLst>
-              <a:ext uri="{FF2B5EF4-FFF2-40B4-BE49-F238E27FC236}">
-                <a16:creationId xmlns:a16="http://schemas.microsoft.com/office/drawing/2014/main" id="{4E42140B-9B43-39D8-E15F-C9791153BE5E}"/>
-              </a:ext>
-            </a:extLst>
-          </p:cNvPr>
-          <p:cNvCxnSpPr>
-            <a:cxnSpLocks/>
-          </p:cNvCxnSpPr>
-          <p:nvPr/>
-        </p:nvCxnSpPr>
-        <p:spPr bwMode="auto">
-          <a:xfrm flipH="1" flipV="1">
-            <a:off x="6734635" y="5828425"/>
-            <a:ext cx="199565" cy="282837"/>
-          </a:xfrm>
-          <a:prstGeom prst="line">
-            <a:avLst/>
-          </a:prstGeom>
-          <a:solidFill>
-            <a:schemeClr val="accent1"/>
-          </a:solidFill>
-          <a:ln w="9525" cap="flat" cmpd="sng" algn="ctr">
-            <a:solidFill>
-              <a:schemeClr val="tx1"/>
-            </a:solidFill>
-            <a:prstDash val="dash"/>
-            <a:miter lim="800000"/>
-            <a:headEnd type="none" w="med" len="med"/>
-            <a:tailEnd type="none" w="med" len="med"/>
-          </a:ln>
-          <a:effectLst/>
-        </p:spPr>
-      </p:cxnSp>
-      <p:cxnSp>
-        <p:nvCxnSpPr>
-          <p:cNvPr id="131" name="Straight Connector 130">
-            <a:extLst>
-              <a:ext uri="{FF2B5EF4-FFF2-40B4-BE49-F238E27FC236}">
-                <a16:creationId xmlns:a16="http://schemas.microsoft.com/office/drawing/2014/main" id="{BD444EDD-EB33-7234-9D68-4418D7E0CE65}"/>
-              </a:ext>
-            </a:extLst>
-          </p:cNvPr>
-          <p:cNvCxnSpPr>
-            <a:cxnSpLocks/>
-          </p:cNvCxnSpPr>
-          <p:nvPr/>
-        </p:nvCxnSpPr>
-        <p:spPr bwMode="auto">
-          <a:xfrm>
-            <a:off x="3249049" y="5089682"/>
-            <a:ext cx="0" cy="570841"/>
-          </a:xfrm>
-          <a:prstGeom prst="line">
-            <a:avLst/>
-          </a:prstGeom>
-          <a:solidFill>
-            <a:schemeClr val="accent1"/>
-          </a:solidFill>
-          <a:ln w="38100" cap="flat" cmpd="sng" algn="ctr">
-            <a:solidFill>
-              <a:srgbClr val="C00000"/>
-            </a:solidFill>
             <a:prstDash val="solid"/>
             <a:miter lim="800000"/>
             <a:headEnd type="none" w="med" len="med"/>
@@ -42982,46 +43252,40 @@
           </a:ln>
           <a:effectLst/>
         </p:spPr>
-      </p:cxnSp>
-      <p:sp>
-        <p:nvSpPr>
-          <p:cNvPr id="132" name="TextBox 131">
-            <a:extLst>
-              <a:ext uri="{FF2B5EF4-FFF2-40B4-BE49-F238E27FC236}">
-                <a16:creationId xmlns:a16="http://schemas.microsoft.com/office/drawing/2014/main" id="{9F95FD96-4479-865E-6E4A-8560A38E2837}"/>
-              </a:ext>
-            </a:extLst>
-          </p:cNvPr>
-          <p:cNvSpPr txBox="1"/>
-          <p:nvPr/>
-        </p:nvSpPr>
-        <p:spPr>
-          <a:xfrm>
-            <a:off x="2518430" y="4715217"/>
-            <a:ext cx="330540" cy="461665"/>
-          </a:xfrm>
-          <a:prstGeom prst="rect">
-            <a:avLst/>
-          </a:prstGeom>
-          <a:noFill/>
-        </p:spPr>
-        <p:txBody>
-          <a:bodyPr wrap="none" rtlCol="0">
-            <a:spAutoFit/>
+        <p:txBody>
+          <a:bodyPr vert="horz" wrap="none" lIns="91440" tIns="45720" rIns="91440" bIns="45720" numCol="1" rtlCol="0" anchor="t" anchorCtr="0" compatLnSpc="1">
+            <a:prstTxWarp prst="textNoShape">
+              <a:avLst/>
+            </a:prstTxWarp>
           </a:bodyPr>
           <a:lstStyle/>
           <a:p>
-            <a:r>
-              <a:rPr lang="en-US" dirty="0">
-                <a:solidFill>
-                  <a:schemeClr val="tx2">
-                    <a:lumMod val="60000"/>
-                    <a:lumOff val="40000"/>
-                  </a:schemeClr>
-                </a:solidFill>
-              </a:rPr>
-              <a:t>?</a:t>
-            </a:r>
+            <a:pPr marL="0" marR="0" indent="0" algn="l" defTabSz="914400" rtl="0" eaLnBrk="1" fontAlgn="base" latinLnBrk="0" hangingPunct="1">
+              <a:lnSpc>
+                <a:spcPct val="100000"/>
+              </a:lnSpc>
+              <a:spcBef>
+                <a:spcPct val="0"/>
+              </a:spcBef>
+              <a:spcAft>
+                <a:spcPct val="0"/>
+              </a:spcAft>
+              <a:buClrTx/>
+              <a:buSzTx/>
+              <a:buFontTx/>
+              <a:buNone/>
+              <a:tabLst/>
+            </a:pPr>
+            <a:endParaRPr kumimoji="0" lang="en-US" sz="2400" b="0" i="0" u="none" strike="noStrike" cap="none" normalizeH="0" baseline="0">
+              <a:ln>
+                <a:noFill/>
+              </a:ln>
+              <a:solidFill>
+                <a:schemeClr val="tx1"/>
+              </a:solidFill>
+              <a:effectLst/>
+              <a:latin typeface="Tahoma" charset="0"/>
+            </a:endParaRPr>
           </a:p>
         </p:txBody>
       </p:sp>
@@ -44580,6 +44844,12 @@
             <a:r>
               <a:rPr lang="en-US" dirty="0"/>
               <a:t>) for HAMR components</a:t>
+            </a:r>
+          </a:p>
+          <a:p>
+            <a:r>
+              <a:rPr lang="en-US" dirty="0"/>
+              <a:t>What about component pre-conditions not related to the current abstract function that we are trying to reason about</a:t>
             </a:r>
           </a:p>
         </p:txBody>

</xml_diff>